<commit_message>
Update DATOS COVID Chile 2022 06 11.pptx
</commit_message>
<xml_diff>
--- a/DATOS COVID Chile 2022 06 11.pptx
+++ b/DATOS COVID Chile 2022 06 11.pptx
@@ -5,7 +5,7 @@
     <p:sldMasterId id="2147483648" r:id="rId1"/>
   </p:sldMasterIdLst>
   <p:notesMasterIdLst>
-    <p:notesMasterId r:id="rId27"/>
+    <p:notesMasterId r:id="rId29"/>
   </p:notesMasterIdLst>
   <p:sldIdLst>
     <p:sldId id="266" r:id="rId2"/>
@@ -23,16 +23,18 @@
     <p:sldId id="277" r:id="rId14"/>
     <p:sldId id="449" r:id="rId15"/>
     <p:sldId id="469" r:id="rId16"/>
-    <p:sldId id="426" r:id="rId17"/>
-    <p:sldId id="280" r:id="rId18"/>
-    <p:sldId id="281" r:id="rId19"/>
-    <p:sldId id="417" r:id="rId20"/>
-    <p:sldId id="431" r:id="rId21"/>
-    <p:sldId id="438" r:id="rId22"/>
-    <p:sldId id="407" r:id="rId23"/>
-    <p:sldId id="509" r:id="rId24"/>
-    <p:sldId id="510" r:id="rId25"/>
-    <p:sldId id="424" r:id="rId26"/>
+    <p:sldId id="528" r:id="rId17"/>
+    <p:sldId id="529" r:id="rId18"/>
+    <p:sldId id="426" r:id="rId19"/>
+    <p:sldId id="280" r:id="rId20"/>
+    <p:sldId id="281" r:id="rId21"/>
+    <p:sldId id="417" r:id="rId22"/>
+    <p:sldId id="431" r:id="rId23"/>
+    <p:sldId id="438" r:id="rId24"/>
+    <p:sldId id="407" r:id="rId25"/>
+    <p:sldId id="509" r:id="rId26"/>
+    <p:sldId id="510" r:id="rId27"/>
+    <p:sldId id="424" r:id="rId28"/>
   </p:sldIdLst>
   <p:sldSz cx="12192000" cy="6858000"/>
   <p:notesSz cx="6858000" cy="9144000"/>
@@ -620,6 +622,122 @@
 </p:notes>
 </file>
 
+<file path=ppt/notesSlides/notesSlide10.xml><?xml version="1.0" encoding="utf-8"?>
+<p:notes xmlns:a="http://schemas.openxmlformats.org/drawingml/2006/main" xmlns:r="http://schemas.openxmlformats.org/officeDocument/2006/relationships" xmlns:p="http://schemas.openxmlformats.org/presentationml/2006/main">
+  <p:cSld>
+    <p:spTree>
+      <p:nvGrpSpPr>
+        <p:cNvPr id="1" name=""/>
+        <p:cNvGrpSpPr/>
+        <p:nvPr/>
+      </p:nvGrpSpPr>
+      <p:grpSpPr>
+        <a:xfrm>
+          <a:off x="0" y="0"/>
+          <a:ext cx="0" cy="0"/>
+          <a:chOff x="0" y="0"/>
+          <a:chExt cx="0" cy="0"/>
+        </a:xfrm>
+      </p:grpSpPr>
+      <p:sp>
+        <p:nvSpPr>
+          <p:cNvPr id="2" name="Slide Image Placeholder 1"/>
+          <p:cNvSpPr>
+            <a:spLocks noGrp="1" noRot="1" noChangeAspect="1"/>
+          </p:cNvSpPr>
+          <p:nvPr>
+            <p:ph type="sldImg"/>
+          </p:nvPr>
+        </p:nvSpPr>
+        <p:spPr/>
+      </p:sp>
+      <p:sp>
+        <p:nvSpPr>
+          <p:cNvPr id="3" name="Notes Placeholder 2"/>
+          <p:cNvSpPr>
+            <a:spLocks noGrp="1"/>
+          </p:cNvSpPr>
+          <p:nvPr>
+            <p:ph type="body" idx="1"/>
+          </p:nvPr>
+        </p:nvSpPr>
+        <p:spPr/>
+        <p:txBody>
+          <a:bodyPr/>
+          <a:lstStyle/>
+          <a:p>
+            <a:r>
+              <a:rPr lang="en-US" dirty="0"/>
+              <a:t>OMS: </a:t>
+            </a:r>
+            <a:r>
+              <a:rPr lang="en-US" dirty="0" err="1"/>
+              <a:t>Menor</a:t>
+            </a:r>
+            <a:r>
+              <a:rPr lang="en-US" dirty="0"/>
+              <a:t> a 5% </a:t>
+            </a:r>
+            <a:r>
+              <a:rPr lang="en-US" dirty="0" err="1"/>
+              <a:t>en</a:t>
+            </a:r>
+            <a:r>
+              <a:rPr lang="en-US" dirty="0"/>
+              <a:t> </a:t>
+            </a:r>
+            <a:r>
+              <a:rPr lang="en-US" dirty="0" err="1"/>
+              <a:t>últimas</a:t>
+            </a:r>
+            <a:r>
+              <a:rPr lang="en-US" dirty="0"/>
+              <a:t> 2 </a:t>
+            </a:r>
+            <a:r>
+              <a:rPr lang="en-US" dirty="0" err="1"/>
+              <a:t>semanas</a:t>
+            </a:r>
+            <a:endParaRPr lang="en-US" dirty="0"/>
+          </a:p>
+        </p:txBody>
+      </p:sp>
+      <p:sp>
+        <p:nvSpPr>
+          <p:cNvPr id="4" name="Slide Number Placeholder 3"/>
+          <p:cNvSpPr>
+            <a:spLocks noGrp="1"/>
+          </p:cNvSpPr>
+          <p:nvPr>
+            <p:ph type="sldNum" sz="quarter" idx="5"/>
+          </p:nvPr>
+        </p:nvSpPr>
+        <p:spPr/>
+        <p:txBody>
+          <a:bodyPr/>
+          <a:lstStyle/>
+          <a:p>
+            <a:fld id="{843DCC2D-BF8E-6546-A31C-967437B0E67F}" type="slidenum">
+              <a:rPr lang="en-US" smtClean="0"/>
+              <a:t>21</a:t>
+            </a:fld>
+            <a:endParaRPr lang="en-US"/>
+          </a:p>
+        </p:txBody>
+      </p:sp>
+    </p:spTree>
+    <p:extLst>
+      <p:ext uri="{BB962C8B-B14F-4D97-AF65-F5344CB8AC3E}">
+        <p14:creationId xmlns:p14="http://schemas.microsoft.com/office/powerpoint/2010/main" val="2432418610"/>
+      </p:ext>
+    </p:extLst>
+  </p:cSld>
+  <p:clrMapOvr>
+    <a:masterClrMapping/>
+  </p:clrMapOvr>
+</p:notes>
+</file>
+
 <file path=ppt/notesSlides/notesSlide2.xml><?xml version="1.0" encoding="utf-8"?>
 <p:notes xmlns:a="http://schemas.openxmlformats.org/drawingml/2006/main" xmlns:r="http://schemas.openxmlformats.org/officeDocument/2006/relationships" xmlns:p="http://schemas.openxmlformats.org/presentationml/2006/main">
   <p:cSld>
@@ -1390,7 +1508,7 @@
     </p:spTree>
     <p:extLst>
       <p:ext uri="{BB962C8B-B14F-4D97-AF65-F5344CB8AC3E}">
-        <p14:creationId xmlns:p14="http://schemas.microsoft.com/office/powerpoint/2010/main" val="1540371733"/>
+        <p14:creationId xmlns:p14="http://schemas.microsoft.com/office/powerpoint/2010/main" val="786722580"/>
       </p:ext>
     </p:extLst>
   </p:cSld>
@@ -1446,15 +1564,30 @@
           <a:p>
             <a:r>
               <a:rPr lang="en-US" dirty="0"/>
-              <a:t>OMS: </a:t>
+              <a:t>OMS</a:t>
+            </a:r>
+            <a:br>
+              <a:rPr lang="en-US" dirty="0"/>
+            </a:br>
+            <a:r>
+              <a:rPr lang="en-US" dirty="0"/>
+              <a:t>Baja </a:t>
             </a:r>
             <a:r>
               <a:rPr lang="en-US" dirty="0" err="1"/>
-              <a:t>Menor</a:t>
-            </a:r>
-            <a:r>
-              <a:rPr lang="en-US" dirty="0"/>
-              <a:t> a 5% </a:t>
+              <a:t>sostenida</a:t>
+            </a:r>
+            <a:r>
+              <a:rPr lang="en-US" dirty="0"/>
+              <a:t> (reducer a la </a:t>
+            </a:r>
+            <a:r>
+              <a:rPr lang="en-US" dirty="0" err="1"/>
+              <a:t>mitad</a:t>
+            </a:r>
+            <a:r>
+              <a:rPr lang="en-US" dirty="0"/>
+              <a:t> </a:t>
             </a:r>
             <a:r>
               <a:rPr lang="en-US" dirty="0" err="1"/>
@@ -1462,20 +1595,61 @@
             </a:r>
             <a:r>
               <a:rPr lang="en-US" dirty="0"/>
-              <a:t> </a:t>
-            </a:r>
-            <a:r>
-              <a:rPr lang="en-US" dirty="0" err="1"/>
-              <a:t>últimas</a:t>
-            </a:r>
-            <a:r>
-              <a:rPr lang="en-US" dirty="0"/>
-              <a:t> 2 </a:t>
+              <a:t> 3 </a:t>
             </a:r>
             <a:r>
               <a:rPr lang="en-US" dirty="0" err="1"/>
               <a:t>semanas</a:t>
             </a:r>
+            <a:r>
+              <a:rPr lang="en-US" dirty="0"/>
+              <a:t>”</a:t>
+            </a:r>
+          </a:p>
+          <a:p>
+            <a:endParaRPr lang="en-US" dirty="0"/>
+          </a:p>
+          <a:p>
+            <a:r>
+              <a:rPr lang="en-US" dirty="0"/>
+              <a:t>UK:</a:t>
+            </a:r>
+            <a:br>
+              <a:rPr lang="en-US" dirty="0"/>
+            </a:br>
+            <a:r>
+              <a:rPr lang="en-US" dirty="0"/>
+              <a:t>Bajo 14 para </a:t>
+            </a:r>
+            <a:r>
+              <a:rPr lang="en-US" dirty="0" err="1"/>
+              <a:t>abrir</a:t>
+            </a:r>
+            <a:r>
+              <a:rPr lang="en-US" dirty="0"/>
+              <a:t> </a:t>
+            </a:r>
+            <a:r>
+              <a:rPr lang="en-US" dirty="0" err="1"/>
+              <a:t>escuelas</a:t>
+            </a:r>
+            <a:endParaRPr lang="en-US" dirty="0"/>
+          </a:p>
+          <a:p>
+            <a:r>
+              <a:rPr lang="en-US" dirty="0"/>
+              <a:t>Bajo 1,4 para </a:t>
+            </a:r>
+            <a:r>
+              <a:rPr lang="en-US" dirty="0" err="1"/>
+              <a:t>abrir</a:t>
+            </a:r>
+            <a:r>
+              <a:rPr lang="en-US" dirty="0"/>
+              <a:t> el resto</a:t>
+            </a:r>
+          </a:p>
+          <a:p>
             <a:endParaRPr lang="en-US" dirty="0"/>
           </a:p>
         </p:txBody>
@@ -1497,7 +1671,7 @@
           <a:p>
             <a:fld id="{843DCC2D-BF8E-6546-A31C-967437B0E67F}" type="slidenum">
               <a:rPr lang="en-US" smtClean="0"/>
-              <a:t>18</a:t>
+              <a:t>17</a:t>
             </a:fld>
             <a:endParaRPr lang="en-US"/>
           </a:p>
@@ -1506,7 +1680,7 @@
     </p:spTree>
     <p:extLst>
       <p:ext uri="{BB962C8B-B14F-4D97-AF65-F5344CB8AC3E}">
-        <p14:creationId xmlns:p14="http://schemas.microsoft.com/office/powerpoint/2010/main" val="4163690373"/>
+        <p14:creationId xmlns:p14="http://schemas.microsoft.com/office/powerpoint/2010/main" val="2541062840"/>
       </p:ext>
     </p:extLst>
   </p:cSld>
@@ -1562,15 +1736,30 @@
           <a:p>
             <a:r>
               <a:rPr lang="en-US" dirty="0"/>
-              <a:t>OMS: </a:t>
+              <a:t>OMS</a:t>
+            </a:r>
+            <a:br>
+              <a:rPr lang="en-US" dirty="0"/>
+            </a:br>
+            <a:r>
+              <a:rPr lang="en-US" dirty="0"/>
+              <a:t>Baja </a:t>
             </a:r>
             <a:r>
               <a:rPr lang="en-US" dirty="0" err="1"/>
-              <a:t>Menor</a:t>
-            </a:r>
-            <a:r>
-              <a:rPr lang="en-US" dirty="0"/>
-              <a:t> a 5% </a:t>
+              <a:t>sostenida</a:t>
+            </a:r>
+            <a:r>
+              <a:rPr lang="en-US" dirty="0"/>
+              <a:t> (reducer a la </a:t>
+            </a:r>
+            <a:r>
+              <a:rPr lang="en-US" dirty="0" err="1"/>
+              <a:t>mitad</a:t>
+            </a:r>
+            <a:r>
+              <a:rPr lang="en-US" dirty="0"/>
+              <a:t> </a:t>
             </a:r>
             <a:r>
               <a:rPr lang="en-US" dirty="0" err="1"/>
@@ -1578,20 +1767,61 @@
             </a:r>
             <a:r>
               <a:rPr lang="en-US" dirty="0"/>
-              <a:t> </a:t>
-            </a:r>
-            <a:r>
-              <a:rPr lang="en-US" dirty="0" err="1"/>
-              <a:t>últimas</a:t>
-            </a:r>
-            <a:r>
-              <a:rPr lang="en-US" dirty="0"/>
-              <a:t> 2 </a:t>
+              <a:t> 3 </a:t>
             </a:r>
             <a:r>
               <a:rPr lang="en-US" dirty="0" err="1"/>
               <a:t>semanas</a:t>
             </a:r>
+            <a:r>
+              <a:rPr lang="en-US" dirty="0"/>
+              <a:t>”</a:t>
+            </a:r>
+          </a:p>
+          <a:p>
+            <a:endParaRPr lang="en-US" dirty="0"/>
+          </a:p>
+          <a:p>
+            <a:r>
+              <a:rPr lang="en-US" dirty="0"/>
+              <a:t>UK:</a:t>
+            </a:r>
+            <a:br>
+              <a:rPr lang="en-US" dirty="0"/>
+            </a:br>
+            <a:r>
+              <a:rPr lang="en-US" dirty="0"/>
+              <a:t>Bajo 14 para </a:t>
+            </a:r>
+            <a:r>
+              <a:rPr lang="en-US" dirty="0" err="1"/>
+              <a:t>abrir</a:t>
+            </a:r>
+            <a:r>
+              <a:rPr lang="en-US" dirty="0"/>
+              <a:t> </a:t>
+            </a:r>
+            <a:r>
+              <a:rPr lang="en-US" dirty="0" err="1"/>
+              <a:t>escuelas</a:t>
+            </a:r>
+            <a:endParaRPr lang="en-US" dirty="0"/>
+          </a:p>
+          <a:p>
+            <a:r>
+              <a:rPr lang="en-US" dirty="0"/>
+              <a:t>Bajo 1,4 para </a:t>
+            </a:r>
+            <a:r>
+              <a:rPr lang="en-US" dirty="0" err="1"/>
+              <a:t>abrir</a:t>
+            </a:r>
+            <a:r>
+              <a:rPr lang="en-US" dirty="0"/>
+              <a:t> el resto</a:t>
+            </a:r>
+          </a:p>
+          <a:p>
             <a:endParaRPr lang="en-US" dirty="0"/>
           </a:p>
         </p:txBody>
@@ -1613,7 +1843,7 @@
           <a:p>
             <a:fld id="{843DCC2D-BF8E-6546-A31C-967437B0E67F}" type="slidenum">
               <a:rPr lang="en-US" smtClean="0"/>
-              <a:t>19</a:t>
+              <a:t>18</a:t>
             </a:fld>
             <a:endParaRPr lang="en-US"/>
           </a:p>
@@ -1622,7 +1852,123 @@
     </p:spTree>
     <p:extLst>
       <p:ext uri="{BB962C8B-B14F-4D97-AF65-F5344CB8AC3E}">
-        <p14:creationId xmlns:p14="http://schemas.microsoft.com/office/powerpoint/2010/main" val="2432418610"/>
+        <p14:creationId xmlns:p14="http://schemas.microsoft.com/office/powerpoint/2010/main" val="1540371733"/>
+      </p:ext>
+    </p:extLst>
+  </p:cSld>
+  <p:clrMapOvr>
+    <a:masterClrMapping/>
+  </p:clrMapOvr>
+</p:notes>
+</file>
+
+<file path=ppt/notesSlides/notesSlide9.xml><?xml version="1.0" encoding="utf-8"?>
+<p:notes xmlns:a="http://schemas.openxmlformats.org/drawingml/2006/main" xmlns:r="http://schemas.openxmlformats.org/officeDocument/2006/relationships" xmlns:p="http://schemas.openxmlformats.org/presentationml/2006/main">
+  <p:cSld>
+    <p:spTree>
+      <p:nvGrpSpPr>
+        <p:cNvPr id="1" name=""/>
+        <p:cNvGrpSpPr/>
+        <p:nvPr/>
+      </p:nvGrpSpPr>
+      <p:grpSpPr>
+        <a:xfrm>
+          <a:off x="0" y="0"/>
+          <a:ext cx="0" cy="0"/>
+          <a:chOff x="0" y="0"/>
+          <a:chExt cx="0" cy="0"/>
+        </a:xfrm>
+      </p:grpSpPr>
+      <p:sp>
+        <p:nvSpPr>
+          <p:cNvPr id="2" name="Slide Image Placeholder 1"/>
+          <p:cNvSpPr>
+            <a:spLocks noGrp="1" noRot="1" noChangeAspect="1"/>
+          </p:cNvSpPr>
+          <p:nvPr>
+            <p:ph type="sldImg"/>
+          </p:nvPr>
+        </p:nvSpPr>
+        <p:spPr/>
+      </p:sp>
+      <p:sp>
+        <p:nvSpPr>
+          <p:cNvPr id="3" name="Notes Placeholder 2"/>
+          <p:cNvSpPr>
+            <a:spLocks noGrp="1"/>
+          </p:cNvSpPr>
+          <p:nvPr>
+            <p:ph type="body" idx="1"/>
+          </p:nvPr>
+        </p:nvSpPr>
+        <p:spPr/>
+        <p:txBody>
+          <a:bodyPr/>
+          <a:lstStyle/>
+          <a:p>
+            <a:r>
+              <a:rPr lang="en-US" dirty="0"/>
+              <a:t>OMS: </a:t>
+            </a:r>
+            <a:r>
+              <a:rPr lang="en-US" dirty="0" err="1"/>
+              <a:t>Menor</a:t>
+            </a:r>
+            <a:r>
+              <a:rPr lang="en-US" dirty="0"/>
+              <a:t> a 5% </a:t>
+            </a:r>
+            <a:r>
+              <a:rPr lang="en-US" dirty="0" err="1"/>
+              <a:t>en</a:t>
+            </a:r>
+            <a:r>
+              <a:rPr lang="en-US" dirty="0"/>
+              <a:t> </a:t>
+            </a:r>
+            <a:r>
+              <a:rPr lang="en-US" dirty="0" err="1"/>
+              <a:t>últimas</a:t>
+            </a:r>
+            <a:r>
+              <a:rPr lang="en-US" dirty="0"/>
+              <a:t> 2 </a:t>
+            </a:r>
+            <a:r>
+              <a:rPr lang="en-US" dirty="0" err="1"/>
+              <a:t>semanas</a:t>
+            </a:r>
+            <a:endParaRPr lang="en-US" dirty="0"/>
+          </a:p>
+        </p:txBody>
+      </p:sp>
+      <p:sp>
+        <p:nvSpPr>
+          <p:cNvPr id="4" name="Slide Number Placeholder 3"/>
+          <p:cNvSpPr>
+            <a:spLocks noGrp="1"/>
+          </p:cNvSpPr>
+          <p:nvPr>
+            <p:ph type="sldNum" sz="quarter" idx="5"/>
+          </p:nvPr>
+        </p:nvSpPr>
+        <p:spPr/>
+        <p:txBody>
+          <a:bodyPr/>
+          <a:lstStyle/>
+          <a:p>
+            <a:fld id="{843DCC2D-BF8E-6546-A31C-967437B0E67F}" type="slidenum">
+              <a:rPr lang="en-US" smtClean="0"/>
+              <a:t>20</a:t>
+            </a:fld>
+            <a:endParaRPr lang="en-US"/>
+          </a:p>
+        </p:txBody>
+      </p:sp>
+    </p:spTree>
+    <p:extLst>
+      <p:ext uri="{BB962C8B-B14F-4D97-AF65-F5344CB8AC3E}">
+        <p14:creationId xmlns:p14="http://schemas.microsoft.com/office/powerpoint/2010/main" val="4163690373"/>
       </p:ext>
     </p:extLst>
   </p:cSld>
@@ -6168,6 +6514,344 @@
         </p:nvSpPr>
         <p:spPr>
           <a:xfrm>
+            <a:off x="524933" y="128200"/>
+            <a:ext cx="11159067" cy="584775"/>
+          </a:xfrm>
+          <a:prstGeom prst="rect">
+            <a:avLst/>
+          </a:prstGeom>
+          <a:solidFill>
+            <a:schemeClr val="bg1"/>
+          </a:solidFill>
+        </p:spPr>
+        <p:txBody>
+          <a:bodyPr wrap="square" rtlCol="0">
+            <a:spAutoFit/>
+          </a:bodyPr>
+          <a:lstStyle/>
+          <a:p>
+            <a:pPr algn="ctr"/>
+            <a:r>
+              <a:rPr lang="en-US" sz="3200" dirty="0"/>
+              <a:t>PROMEDIO DE CASOS DIARIOS A LO LARGO DE LA PANDEMIA</a:t>
+            </a:r>
+          </a:p>
+        </p:txBody>
+      </p:sp>
+      <p:pic>
+        <p:nvPicPr>
+          <p:cNvPr id="4" name="Picture 3">
+            <a:extLst>
+              <a:ext uri="{FF2B5EF4-FFF2-40B4-BE49-F238E27FC236}">
+                <a16:creationId xmlns:a16="http://schemas.microsoft.com/office/drawing/2014/main" id="{11AF4F7D-D4EA-EA77-26F1-0ED59C409B3E}"/>
+              </a:ext>
+            </a:extLst>
+          </p:cNvPr>
+          <p:cNvPicPr>
+            <a:picLocks noChangeAspect="1"/>
+          </p:cNvPicPr>
+          <p:nvPr/>
+        </p:nvPicPr>
+        <p:blipFill>
+          <a:blip r:embed="rId3"/>
+          <a:stretch>
+            <a:fillRect/>
+          </a:stretch>
+        </p:blipFill>
+        <p:spPr>
+          <a:xfrm>
+            <a:off x="1984871" y="712975"/>
+            <a:ext cx="8222257" cy="5336299"/>
+          </a:xfrm>
+          <a:prstGeom prst="rect">
+            <a:avLst/>
+          </a:prstGeom>
+        </p:spPr>
+      </p:pic>
+      <p:sp>
+        <p:nvSpPr>
+          <p:cNvPr id="7" name="TextBox 6">
+            <a:extLst>
+              <a:ext uri="{FF2B5EF4-FFF2-40B4-BE49-F238E27FC236}">
+                <a16:creationId xmlns:a16="http://schemas.microsoft.com/office/drawing/2014/main" id="{CB4A9AFB-76A6-8715-588E-9C53DE4E2B34}"/>
+              </a:ext>
+            </a:extLst>
+          </p:cNvPr>
+          <p:cNvSpPr txBox="1"/>
+          <p:nvPr/>
+        </p:nvSpPr>
+        <p:spPr>
+          <a:xfrm rot="16200000">
+            <a:off x="1035923" y="3301980"/>
+            <a:ext cx="1585755" cy="369332"/>
+          </a:xfrm>
+          <a:prstGeom prst="rect">
+            <a:avLst/>
+          </a:prstGeom>
+          <a:noFill/>
+        </p:spPr>
+        <p:txBody>
+          <a:bodyPr wrap="none" rtlCol="0">
+            <a:spAutoFit/>
+          </a:bodyPr>
+          <a:lstStyle/>
+          <a:p>
+            <a:r>
+              <a:rPr lang="en-CL" dirty="0"/>
+              <a:t>ESCALA LINEAL</a:t>
+            </a:r>
+          </a:p>
+        </p:txBody>
+      </p:sp>
+      <p:cxnSp>
+        <p:nvCxnSpPr>
+          <p:cNvPr id="9" name="Straight Connector 8">
+            <a:extLst>
+              <a:ext uri="{FF2B5EF4-FFF2-40B4-BE49-F238E27FC236}">
+                <a16:creationId xmlns:a16="http://schemas.microsoft.com/office/drawing/2014/main" id="{FDC88A65-6EC3-8B27-1A1A-4854BB9F428F}"/>
+              </a:ext>
+            </a:extLst>
+          </p:cNvPr>
+          <p:cNvCxnSpPr/>
+          <p:nvPr/>
+        </p:nvCxnSpPr>
+        <p:spPr>
+          <a:xfrm>
+            <a:off x="2971692" y="4382872"/>
+            <a:ext cx="7416800" cy="0"/>
+          </a:xfrm>
+          <a:prstGeom prst="line">
+            <a:avLst/>
+          </a:prstGeom>
+        </p:spPr>
+        <p:style>
+          <a:lnRef idx="1">
+            <a:schemeClr val="accent1"/>
+          </a:lnRef>
+          <a:fillRef idx="0">
+            <a:schemeClr val="accent1"/>
+          </a:fillRef>
+          <a:effectRef idx="0">
+            <a:schemeClr val="accent1"/>
+          </a:effectRef>
+          <a:fontRef idx="minor">
+            <a:schemeClr val="tx1"/>
+          </a:fontRef>
+        </p:style>
+      </p:cxnSp>
+    </p:spTree>
+    <p:extLst>
+      <p:ext uri="{BB962C8B-B14F-4D97-AF65-F5344CB8AC3E}">
+        <p14:creationId xmlns:p14="http://schemas.microsoft.com/office/powerpoint/2010/main" val="3853744546"/>
+      </p:ext>
+    </p:extLst>
+  </p:cSld>
+  <p:clrMapOvr>
+    <a:masterClrMapping/>
+  </p:clrMapOvr>
+</p:sld>
+</file>
+
+<file path=ppt/slides/slide17.xml><?xml version="1.0" encoding="utf-8"?>
+<p:sld xmlns:a="http://schemas.openxmlformats.org/drawingml/2006/main" xmlns:r="http://schemas.openxmlformats.org/officeDocument/2006/relationships" xmlns:p="http://schemas.openxmlformats.org/presentationml/2006/main">
+  <p:cSld>
+    <p:spTree>
+      <p:nvGrpSpPr>
+        <p:cNvPr id="1" name=""/>
+        <p:cNvGrpSpPr/>
+        <p:nvPr/>
+      </p:nvGrpSpPr>
+      <p:grpSpPr>
+        <a:xfrm>
+          <a:off x="0" y="0"/>
+          <a:ext cx="0" cy="0"/>
+          <a:chOff x="0" y="0"/>
+          <a:chExt cx="0" cy="0"/>
+        </a:xfrm>
+      </p:grpSpPr>
+      <p:sp>
+        <p:nvSpPr>
+          <p:cNvPr id="6" name="TextBox 5">
+            <a:extLst>
+              <a:ext uri="{FF2B5EF4-FFF2-40B4-BE49-F238E27FC236}">
+                <a16:creationId xmlns:a16="http://schemas.microsoft.com/office/drawing/2014/main" id="{AB65407A-4582-004A-A45F-BD87B99ABAF2}"/>
+              </a:ext>
+            </a:extLst>
+          </p:cNvPr>
+          <p:cNvSpPr txBox="1"/>
+          <p:nvPr/>
+        </p:nvSpPr>
+        <p:spPr>
+          <a:xfrm>
+            <a:off x="524933" y="128200"/>
+            <a:ext cx="11159067" cy="584775"/>
+          </a:xfrm>
+          <a:prstGeom prst="rect">
+            <a:avLst/>
+          </a:prstGeom>
+          <a:solidFill>
+            <a:schemeClr val="bg1"/>
+          </a:solidFill>
+        </p:spPr>
+        <p:txBody>
+          <a:bodyPr wrap="square" rtlCol="0">
+            <a:spAutoFit/>
+          </a:bodyPr>
+          <a:lstStyle/>
+          <a:p>
+            <a:pPr algn="ctr"/>
+            <a:r>
+              <a:rPr lang="en-US" sz="3200" dirty="0"/>
+              <a:t>PROMEDIO DE CASOS DIARIOS A LO LARGO DE LA PANDEMIA</a:t>
+            </a:r>
+          </a:p>
+        </p:txBody>
+      </p:sp>
+      <p:pic>
+        <p:nvPicPr>
+          <p:cNvPr id="3" name="Picture 2">
+            <a:extLst>
+              <a:ext uri="{FF2B5EF4-FFF2-40B4-BE49-F238E27FC236}">
+                <a16:creationId xmlns:a16="http://schemas.microsoft.com/office/drawing/2014/main" id="{402DF250-D2E0-4F54-3886-56D3240FCB60}"/>
+              </a:ext>
+            </a:extLst>
+          </p:cNvPr>
+          <p:cNvPicPr>
+            <a:picLocks noChangeAspect="1"/>
+          </p:cNvPicPr>
+          <p:nvPr/>
+        </p:nvPicPr>
+        <p:blipFill>
+          <a:blip r:embed="rId3"/>
+          <a:stretch>
+            <a:fillRect/>
+          </a:stretch>
+        </p:blipFill>
+        <p:spPr>
+          <a:xfrm>
+            <a:off x="1828800" y="623293"/>
+            <a:ext cx="8709750" cy="5726707"/>
+          </a:xfrm>
+          <a:prstGeom prst="rect">
+            <a:avLst/>
+          </a:prstGeom>
+        </p:spPr>
+      </p:pic>
+      <p:sp>
+        <p:nvSpPr>
+          <p:cNvPr id="4" name="TextBox 3">
+            <a:extLst>
+              <a:ext uri="{FF2B5EF4-FFF2-40B4-BE49-F238E27FC236}">
+                <a16:creationId xmlns:a16="http://schemas.microsoft.com/office/drawing/2014/main" id="{C82692CD-08A2-886A-83EE-79AF25FBA21E}"/>
+              </a:ext>
+            </a:extLst>
+          </p:cNvPr>
+          <p:cNvSpPr txBox="1"/>
+          <p:nvPr/>
+        </p:nvSpPr>
+        <p:spPr>
+          <a:xfrm rot="16200000">
+            <a:off x="693361" y="3301980"/>
+            <a:ext cx="2270878" cy="369332"/>
+          </a:xfrm>
+          <a:prstGeom prst="rect">
+            <a:avLst/>
+          </a:prstGeom>
+          <a:noFill/>
+        </p:spPr>
+        <p:txBody>
+          <a:bodyPr wrap="none" rtlCol="0">
+            <a:spAutoFit/>
+          </a:bodyPr>
+          <a:lstStyle/>
+          <a:p>
+            <a:r>
+              <a:rPr lang="en-CL" dirty="0"/>
+              <a:t>ESCALA LOGARÍTMICA</a:t>
+            </a:r>
+          </a:p>
+        </p:txBody>
+      </p:sp>
+      <p:cxnSp>
+        <p:nvCxnSpPr>
+          <p:cNvPr id="7" name="Straight Connector 6">
+            <a:extLst>
+              <a:ext uri="{FF2B5EF4-FFF2-40B4-BE49-F238E27FC236}">
+                <a16:creationId xmlns:a16="http://schemas.microsoft.com/office/drawing/2014/main" id="{50E2E635-86CE-03FC-1CD7-C26FF9C0DEAF}"/>
+              </a:ext>
+            </a:extLst>
+          </p:cNvPr>
+          <p:cNvCxnSpPr/>
+          <p:nvPr/>
+        </p:nvCxnSpPr>
+        <p:spPr>
+          <a:xfrm>
+            <a:off x="2769812" y="2233438"/>
+            <a:ext cx="7416800" cy="0"/>
+          </a:xfrm>
+          <a:prstGeom prst="line">
+            <a:avLst/>
+          </a:prstGeom>
+        </p:spPr>
+        <p:style>
+          <a:lnRef idx="1">
+            <a:schemeClr val="accent1"/>
+          </a:lnRef>
+          <a:fillRef idx="0">
+            <a:schemeClr val="accent1"/>
+          </a:fillRef>
+          <a:effectRef idx="0">
+            <a:schemeClr val="accent1"/>
+          </a:effectRef>
+          <a:fontRef idx="minor">
+            <a:schemeClr val="tx1"/>
+          </a:fontRef>
+        </p:style>
+      </p:cxnSp>
+    </p:spTree>
+    <p:extLst>
+      <p:ext uri="{BB962C8B-B14F-4D97-AF65-F5344CB8AC3E}">
+        <p14:creationId xmlns:p14="http://schemas.microsoft.com/office/powerpoint/2010/main" val="892119599"/>
+      </p:ext>
+    </p:extLst>
+  </p:cSld>
+  <p:clrMapOvr>
+    <a:masterClrMapping/>
+  </p:clrMapOvr>
+</p:sld>
+</file>
+
+<file path=ppt/slides/slide18.xml><?xml version="1.0" encoding="utf-8"?>
+<p:sld xmlns:a="http://schemas.openxmlformats.org/drawingml/2006/main" xmlns:r="http://schemas.openxmlformats.org/officeDocument/2006/relationships" xmlns:p="http://schemas.openxmlformats.org/presentationml/2006/main">
+  <p:cSld>
+    <p:spTree>
+      <p:nvGrpSpPr>
+        <p:cNvPr id="1" name=""/>
+        <p:cNvGrpSpPr/>
+        <p:nvPr/>
+      </p:nvGrpSpPr>
+      <p:grpSpPr>
+        <a:xfrm>
+          <a:off x="0" y="0"/>
+          <a:ext cx="0" cy="0"/>
+          <a:chOff x="0" y="0"/>
+          <a:chExt cx="0" cy="0"/>
+        </a:xfrm>
+      </p:grpSpPr>
+      <p:sp>
+        <p:nvSpPr>
+          <p:cNvPr id="6" name="TextBox 5">
+            <a:extLst>
+              <a:ext uri="{FF2B5EF4-FFF2-40B4-BE49-F238E27FC236}">
+                <a16:creationId xmlns:a16="http://schemas.microsoft.com/office/drawing/2014/main" id="{AB65407A-4582-004A-A45F-BD87B99ABAF2}"/>
+              </a:ext>
+            </a:extLst>
+          </p:cNvPr>
+          <p:cNvSpPr txBox="1"/>
+          <p:nvPr/>
+        </p:nvSpPr>
+        <p:spPr>
+          <a:xfrm>
             <a:off x="188534" y="128200"/>
             <a:ext cx="6068989" cy="1323439"/>
           </a:xfrm>
@@ -6350,7 +7034,7 @@
 </p:sld>
 </file>
 
-<file path=ppt/slides/slide17.xml><?xml version="1.0" encoding="utf-8"?>
+<file path=ppt/slides/slide19.xml><?xml version="1.0" encoding="utf-8"?>
 <p:sld xmlns:a="http://schemas.openxmlformats.org/drawingml/2006/main" xmlns:r="http://schemas.openxmlformats.org/officeDocument/2006/relationships" xmlns:p="http://schemas.openxmlformats.org/presentationml/2006/main">
   <p:cSld>
     <p:spTree>
@@ -6440,7 +7124,97 @@
 </p:sld>
 </file>
 
-<file path=ppt/slides/slide18.xml><?xml version="1.0" encoding="utf-8"?>
+<file path=ppt/slides/slide2.xml><?xml version="1.0" encoding="utf-8"?>
+<p:sld xmlns:a="http://schemas.openxmlformats.org/drawingml/2006/main" xmlns:r="http://schemas.openxmlformats.org/officeDocument/2006/relationships" xmlns:p="http://schemas.openxmlformats.org/presentationml/2006/main">
+  <p:cSld>
+    <p:spTree>
+      <p:nvGrpSpPr>
+        <p:cNvPr id="1" name=""/>
+        <p:cNvGrpSpPr/>
+        <p:nvPr/>
+      </p:nvGrpSpPr>
+      <p:grpSpPr>
+        <a:xfrm>
+          <a:off x="0" y="0"/>
+          <a:ext cx="0" cy="0"/>
+          <a:chOff x="0" y="0"/>
+          <a:chExt cx="0" cy="0"/>
+        </a:xfrm>
+      </p:grpSpPr>
+      <p:sp>
+        <p:nvSpPr>
+          <p:cNvPr id="4" name="TextBox 3">
+            <a:extLst>
+              <a:ext uri="{FF2B5EF4-FFF2-40B4-BE49-F238E27FC236}">
+                <a16:creationId xmlns:a16="http://schemas.microsoft.com/office/drawing/2014/main" id="{5BCAFE7A-E299-D14E-9413-EB5C984AF441}"/>
+              </a:ext>
+            </a:extLst>
+          </p:cNvPr>
+          <p:cNvSpPr txBox="1"/>
+          <p:nvPr/>
+        </p:nvSpPr>
+        <p:spPr>
+          <a:xfrm>
+            <a:off x="3308808" y="2809188"/>
+            <a:ext cx="5858335" cy="1015663"/>
+          </a:xfrm>
+          <a:prstGeom prst="rect">
+            <a:avLst/>
+          </a:prstGeom>
+          <a:noFill/>
+        </p:spPr>
+        <p:txBody>
+          <a:bodyPr wrap="none" rtlCol="0">
+            <a:spAutoFit/>
+          </a:bodyPr>
+          <a:lstStyle/>
+          <a:p>
+            <a:r>
+              <a:rPr lang="en-US" sz="6000" dirty="0"/>
+              <a:t>PACIENTES EN UCI</a:t>
+            </a:r>
+          </a:p>
+        </p:txBody>
+      </p:sp>
+      <p:sp>
+        <p:nvSpPr>
+          <p:cNvPr id="5" name="Title 4">
+            <a:extLst>
+              <a:ext uri="{FF2B5EF4-FFF2-40B4-BE49-F238E27FC236}">
+                <a16:creationId xmlns:a16="http://schemas.microsoft.com/office/drawing/2014/main" id="{5B465201-ED47-B64A-B505-4DDA25649C32}"/>
+              </a:ext>
+            </a:extLst>
+          </p:cNvPr>
+          <p:cNvSpPr>
+            <a:spLocks noGrp="1"/>
+          </p:cNvSpPr>
+          <p:nvPr>
+            <p:ph type="title"/>
+          </p:nvPr>
+        </p:nvSpPr>
+        <p:spPr/>
+        <p:txBody>
+          <a:bodyPr/>
+          <a:lstStyle/>
+          <a:p>
+            <a:endParaRPr lang="en-US"/>
+          </a:p>
+        </p:txBody>
+      </p:sp>
+    </p:spTree>
+    <p:extLst>
+      <p:ext uri="{BB962C8B-B14F-4D97-AF65-F5344CB8AC3E}">
+        <p14:creationId xmlns:p14="http://schemas.microsoft.com/office/powerpoint/2010/main" val="1473504558"/>
+      </p:ext>
+    </p:extLst>
+  </p:cSld>
+  <p:clrMapOvr>
+    <a:masterClrMapping/>
+  </p:clrMapOvr>
+</p:sld>
+</file>
+
+<file path=ppt/slides/slide20.xml><?xml version="1.0" encoding="utf-8"?>
 <p:sld xmlns:a="http://schemas.openxmlformats.org/drawingml/2006/main" xmlns:r="http://schemas.openxmlformats.org/officeDocument/2006/relationships" xmlns:p="http://schemas.openxmlformats.org/presentationml/2006/main">
   <p:cSld>
     <p:spTree>
@@ -6537,7 +7311,7 @@
 </p:sld>
 </file>
 
-<file path=ppt/slides/slide19.xml><?xml version="1.0" encoding="utf-8"?>
+<file path=ppt/slides/slide21.xml><?xml version="1.0" encoding="utf-8"?>
 <p:sld xmlns:a="http://schemas.openxmlformats.org/drawingml/2006/main" xmlns:r="http://schemas.openxmlformats.org/officeDocument/2006/relationships" xmlns:p="http://schemas.openxmlformats.org/presentationml/2006/main">
   <p:cSld>
     <p:spTree>
@@ -6734,7 +7508,7 @@
 </p:sld>
 </file>
 
-<file path=ppt/slides/slide2.xml><?xml version="1.0" encoding="utf-8"?>
+<file path=ppt/slides/slide22.xml><?xml version="1.0" encoding="utf-8"?>
 <p:sld xmlns:a="http://schemas.openxmlformats.org/drawingml/2006/main" xmlns:r="http://schemas.openxmlformats.org/officeDocument/2006/relationships" xmlns:p="http://schemas.openxmlformats.org/presentationml/2006/main">
   <p:cSld>
     <p:spTree>
@@ -6765,96 +7539,6 @@
         </p:nvSpPr>
         <p:spPr>
           <a:xfrm>
-            <a:off x="3308808" y="2809188"/>
-            <a:ext cx="5858335" cy="1015663"/>
-          </a:xfrm>
-          <a:prstGeom prst="rect">
-            <a:avLst/>
-          </a:prstGeom>
-          <a:noFill/>
-        </p:spPr>
-        <p:txBody>
-          <a:bodyPr wrap="none" rtlCol="0">
-            <a:spAutoFit/>
-          </a:bodyPr>
-          <a:lstStyle/>
-          <a:p>
-            <a:r>
-              <a:rPr lang="en-US" sz="6000" dirty="0"/>
-              <a:t>PACIENTES EN UCI</a:t>
-            </a:r>
-          </a:p>
-        </p:txBody>
-      </p:sp>
-      <p:sp>
-        <p:nvSpPr>
-          <p:cNvPr id="5" name="Title 4">
-            <a:extLst>
-              <a:ext uri="{FF2B5EF4-FFF2-40B4-BE49-F238E27FC236}">
-                <a16:creationId xmlns:a16="http://schemas.microsoft.com/office/drawing/2014/main" id="{5B465201-ED47-B64A-B505-4DDA25649C32}"/>
-              </a:ext>
-            </a:extLst>
-          </p:cNvPr>
-          <p:cNvSpPr>
-            <a:spLocks noGrp="1"/>
-          </p:cNvSpPr>
-          <p:nvPr>
-            <p:ph type="title"/>
-          </p:nvPr>
-        </p:nvSpPr>
-        <p:spPr/>
-        <p:txBody>
-          <a:bodyPr/>
-          <a:lstStyle/>
-          <a:p>
-            <a:endParaRPr lang="en-US"/>
-          </a:p>
-        </p:txBody>
-      </p:sp>
-    </p:spTree>
-    <p:extLst>
-      <p:ext uri="{BB962C8B-B14F-4D97-AF65-F5344CB8AC3E}">
-        <p14:creationId xmlns:p14="http://schemas.microsoft.com/office/powerpoint/2010/main" val="1473504558"/>
-      </p:ext>
-    </p:extLst>
-  </p:cSld>
-  <p:clrMapOvr>
-    <a:masterClrMapping/>
-  </p:clrMapOvr>
-</p:sld>
-</file>
-
-<file path=ppt/slides/slide20.xml><?xml version="1.0" encoding="utf-8"?>
-<p:sld xmlns:a="http://schemas.openxmlformats.org/drawingml/2006/main" xmlns:r="http://schemas.openxmlformats.org/officeDocument/2006/relationships" xmlns:p="http://schemas.openxmlformats.org/presentationml/2006/main">
-  <p:cSld>
-    <p:spTree>
-      <p:nvGrpSpPr>
-        <p:cNvPr id="1" name=""/>
-        <p:cNvGrpSpPr/>
-        <p:nvPr/>
-      </p:nvGrpSpPr>
-      <p:grpSpPr>
-        <a:xfrm>
-          <a:off x="0" y="0"/>
-          <a:ext cx="0" cy="0"/>
-          <a:chOff x="0" y="0"/>
-          <a:chExt cx="0" cy="0"/>
-        </a:xfrm>
-      </p:grpSpPr>
-      <p:sp>
-        <p:nvSpPr>
-          <p:cNvPr id="4" name="TextBox 3">
-            <a:extLst>
-              <a:ext uri="{FF2B5EF4-FFF2-40B4-BE49-F238E27FC236}">
-                <a16:creationId xmlns:a16="http://schemas.microsoft.com/office/drawing/2014/main" id="{5BCAFE7A-E299-D14E-9413-EB5C984AF441}"/>
-              </a:ext>
-            </a:extLst>
-          </p:cNvPr>
-          <p:cNvSpPr txBox="1"/>
-          <p:nvPr/>
-        </p:nvSpPr>
-        <p:spPr>
-          <a:xfrm>
             <a:off x="2570612" y="2790624"/>
             <a:ext cx="7050776" cy="1015663"/>
           </a:xfrm>
@@ -6914,7 +7598,7 @@
 </p:sld>
 </file>
 
-<file path=ppt/slides/slide21.xml><?xml version="1.0" encoding="utf-8"?>
+<file path=ppt/slides/slide23.xml><?xml version="1.0" encoding="utf-8"?>
 <p:sld xmlns:a="http://schemas.openxmlformats.org/drawingml/2006/main" xmlns:r="http://schemas.openxmlformats.org/officeDocument/2006/relationships" xmlns:p="http://schemas.openxmlformats.org/presentationml/2006/main">
   <p:cSld>
     <p:spTree>
@@ -7115,7 +7799,7 @@
 </p:sld>
 </file>
 
-<file path=ppt/slides/slide22.xml><?xml version="1.0" encoding="utf-8"?>
+<file path=ppt/slides/slide24.xml><?xml version="1.0" encoding="utf-8"?>
 <p:sld xmlns:a="http://schemas.openxmlformats.org/drawingml/2006/main" xmlns:r="http://schemas.openxmlformats.org/officeDocument/2006/relationships" xmlns:p="http://schemas.openxmlformats.org/presentationml/2006/main">
   <p:cSld>
     <p:spTree>
@@ -7333,7 +8017,7 @@
 </p:sld>
 </file>
 
-<file path=ppt/slides/slide23.xml><?xml version="1.0" encoding="utf-8"?>
+<file path=ppt/slides/slide25.xml><?xml version="1.0" encoding="utf-8"?>
 <p:sld xmlns:a="http://schemas.openxmlformats.org/drawingml/2006/main" xmlns:r="http://schemas.openxmlformats.org/officeDocument/2006/relationships" xmlns:p="http://schemas.openxmlformats.org/presentationml/2006/main">
   <p:cSld>
     <p:spTree>
@@ -7502,7 +8186,7 @@
 </p:sld>
 </file>
 
-<file path=ppt/slides/slide24.xml><?xml version="1.0" encoding="utf-8"?>
+<file path=ppt/slides/slide26.xml><?xml version="1.0" encoding="utf-8"?>
 <p:sld xmlns:a="http://schemas.openxmlformats.org/drawingml/2006/main" xmlns:r="http://schemas.openxmlformats.org/officeDocument/2006/relationships" xmlns:p="http://schemas.openxmlformats.org/presentationml/2006/main">
   <p:cSld>
     <p:spTree>
@@ -7706,7 +8390,7 @@
 </p:sld>
 </file>
 
-<file path=ppt/slides/slide25.xml><?xml version="1.0" encoding="utf-8"?>
+<file path=ppt/slides/slide27.xml><?xml version="1.0" encoding="utf-8"?>
 <p:sld xmlns:a="http://schemas.openxmlformats.org/drawingml/2006/main" xmlns:r="http://schemas.openxmlformats.org/officeDocument/2006/relationships" xmlns:p="http://schemas.openxmlformats.org/presentationml/2006/main">
   <p:cSld>
     <p:spTree>

</xml_diff>